<commit_message>
update image of median chronogram on workflow figure (fig 1)
</commit_message>
<xml_diff>
--- a/figures/figure-workflow/figure1-new-horizontal.pptx
+++ b/figures/figure-workflow/figure1-new-horizontal.pptx
@@ -243,7 +243,7 @@
           <a:p>
             <a:fld id="{36D6B43A-FB72-2B4A-8DB0-B6C23179BADB}" type="datetimeFigureOut">
               <a:rPr lang="en-US" smtClean="0"/>
-              <a:t>5/20/23</a:t>
+              <a:t>6/5/23</a:t>
             </a:fld>
             <a:endParaRPr lang="en-US"/>
           </a:p>
@@ -413,7 +413,7 @@
           <a:p>
             <a:fld id="{36D6B43A-FB72-2B4A-8DB0-B6C23179BADB}" type="datetimeFigureOut">
               <a:rPr lang="en-US" smtClean="0"/>
-              <a:t>5/20/23</a:t>
+              <a:t>6/5/23</a:t>
             </a:fld>
             <a:endParaRPr lang="en-US"/>
           </a:p>
@@ -593,7 +593,7 @@
           <a:p>
             <a:fld id="{36D6B43A-FB72-2B4A-8DB0-B6C23179BADB}" type="datetimeFigureOut">
               <a:rPr lang="en-US" smtClean="0"/>
-              <a:t>5/20/23</a:t>
+              <a:t>6/5/23</a:t>
             </a:fld>
             <a:endParaRPr lang="en-US"/>
           </a:p>
@@ -763,7 +763,7 @@
           <a:p>
             <a:fld id="{36D6B43A-FB72-2B4A-8DB0-B6C23179BADB}" type="datetimeFigureOut">
               <a:rPr lang="en-US" smtClean="0"/>
-              <a:t>5/20/23</a:t>
+              <a:t>6/5/23</a:t>
             </a:fld>
             <a:endParaRPr lang="en-US"/>
           </a:p>
@@ -1009,7 +1009,7 @@
           <a:p>
             <a:fld id="{36D6B43A-FB72-2B4A-8DB0-B6C23179BADB}" type="datetimeFigureOut">
               <a:rPr lang="en-US" smtClean="0"/>
-              <a:t>5/20/23</a:t>
+              <a:t>6/5/23</a:t>
             </a:fld>
             <a:endParaRPr lang="en-US"/>
           </a:p>
@@ -1241,7 +1241,7 @@
           <a:p>
             <a:fld id="{36D6B43A-FB72-2B4A-8DB0-B6C23179BADB}" type="datetimeFigureOut">
               <a:rPr lang="en-US" smtClean="0"/>
-              <a:t>5/20/23</a:t>
+              <a:t>6/5/23</a:t>
             </a:fld>
             <a:endParaRPr lang="en-US"/>
           </a:p>
@@ -1608,7 +1608,7 @@
           <a:p>
             <a:fld id="{36D6B43A-FB72-2B4A-8DB0-B6C23179BADB}" type="datetimeFigureOut">
               <a:rPr lang="en-US" smtClean="0"/>
-              <a:t>5/20/23</a:t>
+              <a:t>6/5/23</a:t>
             </a:fld>
             <a:endParaRPr lang="en-US"/>
           </a:p>
@@ -1726,7 +1726,7 @@
           <a:p>
             <a:fld id="{36D6B43A-FB72-2B4A-8DB0-B6C23179BADB}" type="datetimeFigureOut">
               <a:rPr lang="en-US" smtClean="0"/>
-              <a:t>5/20/23</a:t>
+              <a:t>6/5/23</a:t>
             </a:fld>
             <a:endParaRPr lang="en-US"/>
           </a:p>
@@ -1821,7 +1821,7 @@
           <a:p>
             <a:fld id="{36D6B43A-FB72-2B4A-8DB0-B6C23179BADB}" type="datetimeFigureOut">
               <a:rPr lang="en-US" smtClean="0"/>
-              <a:t>5/20/23</a:t>
+              <a:t>6/5/23</a:t>
             </a:fld>
             <a:endParaRPr lang="en-US"/>
           </a:p>
@@ -2098,7 +2098,7 @@
           <a:p>
             <a:fld id="{36D6B43A-FB72-2B4A-8DB0-B6C23179BADB}" type="datetimeFigureOut">
               <a:rPr lang="en-US" smtClean="0"/>
-              <a:t>5/20/23</a:t>
+              <a:t>6/5/23</a:t>
             </a:fld>
             <a:endParaRPr lang="en-US"/>
           </a:p>
@@ -2355,7 +2355,7 @@
           <a:p>
             <a:fld id="{36D6B43A-FB72-2B4A-8DB0-B6C23179BADB}" type="datetimeFigureOut">
               <a:rPr lang="en-US" smtClean="0"/>
-              <a:t>5/20/23</a:t>
+              <a:t>6/5/23</a:t>
             </a:fld>
             <a:endParaRPr lang="en-US"/>
           </a:p>
@@ -2568,7 +2568,7 @@
           <a:p>
             <a:fld id="{36D6B43A-FB72-2B4A-8DB0-B6C23179BADB}" type="datetimeFigureOut">
               <a:rPr lang="en-US" smtClean="0"/>
-              <a:t>5/20/23</a:t>
+              <a:t>6/5/23</a:t>
             </a:fld>
             <a:endParaRPr lang="en-US"/>
           </a:p>
@@ -2975,6 +2975,149 @@
       </p:grpSpPr>
       <p:grpSp>
         <p:nvGrpSpPr>
+          <p:cNvPr id="60" name="Group 59">
+            <a:extLst>
+              <a:ext uri="{FF2B5EF4-FFF2-40B4-BE49-F238E27FC236}">
+                <a16:creationId xmlns:a16="http://schemas.microsoft.com/office/drawing/2014/main" id="{96AE2FE4-015D-932D-E3B0-2990117E4907}"/>
+              </a:ext>
+            </a:extLst>
+          </p:cNvPr>
+          <p:cNvGrpSpPr/>
+          <p:nvPr/>
+        </p:nvGrpSpPr>
+        <p:grpSpPr>
+          <a:xfrm>
+            <a:off x="3727941" y="2439695"/>
+            <a:ext cx="3291840" cy="1954059"/>
+            <a:chOff x="3727941" y="2399351"/>
+            <a:chExt cx="3200400" cy="1954059"/>
+          </a:xfrm>
+        </p:grpSpPr>
+        <p:pic>
+          <p:nvPicPr>
+            <p:cNvPr id="58" name="Graphic 57">
+              <a:extLst>
+                <a:ext uri="{FF2B5EF4-FFF2-40B4-BE49-F238E27FC236}">
+                  <a16:creationId xmlns:a16="http://schemas.microsoft.com/office/drawing/2014/main" id="{42851E63-D6B5-9C34-5EA8-0F91C2348C23}"/>
+                </a:ext>
+              </a:extLst>
+            </p:cNvPr>
+            <p:cNvPicPr>
+              <a:picLocks noChangeAspect="1"/>
+            </p:cNvPicPr>
+            <p:nvPr/>
+          </p:nvPicPr>
+          <p:blipFill rotWithShape="1">
+            <a:blip r:embed="rId2">
+              <a:extLst>
+                <a:ext uri="{96DAC541-7B7A-43D3-8B79-37D633B846F1}">
+                  <asvg:svgBlip xmlns:asvg="http://schemas.microsoft.com/office/drawing/2016/SVG/main" r:embed="rId3"/>
+                </a:ext>
+              </a:extLst>
+            </a:blip>
+            <a:srcRect b="21711"/>
+            <a:stretch/>
+          </p:blipFill>
+          <p:spPr>
+            <a:xfrm>
+              <a:off x="3727941" y="2399351"/>
+              <a:ext cx="3200400" cy="1728980"/>
+            </a:xfrm>
+            <a:prstGeom prst="rect">
+              <a:avLst/>
+            </a:prstGeom>
+          </p:spPr>
+        </p:pic>
+        <p:pic>
+          <p:nvPicPr>
+            <p:cNvPr id="59" name="Graphic 58">
+              <a:extLst>
+                <a:ext uri="{FF2B5EF4-FFF2-40B4-BE49-F238E27FC236}">
+                  <a16:creationId xmlns:a16="http://schemas.microsoft.com/office/drawing/2014/main" id="{32FAE6F8-EA79-E7A6-05E8-CE4F0C1EE4EE}"/>
+                </a:ext>
+              </a:extLst>
+            </p:cNvPr>
+            <p:cNvPicPr>
+              <a:picLocks noChangeAspect="1"/>
+            </p:cNvPicPr>
+            <p:nvPr/>
+          </p:nvPicPr>
+          <p:blipFill rotWithShape="1">
+            <a:blip r:embed="rId4">
+              <a:extLst>
+                <a:ext uri="{96DAC541-7B7A-43D3-8B79-37D633B846F1}">
+                  <asvg:svgBlip xmlns:asvg="http://schemas.microsoft.com/office/drawing/2016/SVG/main" r:embed="rId5"/>
+                </a:ext>
+              </a:extLst>
+            </a:blip>
+            <a:srcRect t="87417"/>
+            <a:stretch/>
+          </p:blipFill>
+          <p:spPr>
+            <a:xfrm>
+              <a:off x="4044576" y="4045632"/>
+              <a:ext cx="2670226" cy="307778"/>
+            </a:xfrm>
+            <a:prstGeom prst="rect">
+              <a:avLst/>
+            </a:prstGeom>
+          </p:spPr>
+        </p:pic>
+      </p:grpSp>
+      <p:sp>
+        <p:nvSpPr>
+          <p:cNvPr id="94" name="Rectangle 93">
+            <a:extLst>
+              <a:ext uri="{FF2B5EF4-FFF2-40B4-BE49-F238E27FC236}">
+                <a16:creationId xmlns:a16="http://schemas.microsoft.com/office/drawing/2014/main" id="{7E41B22A-7799-A438-5F15-053CBABEE426}"/>
+              </a:ext>
+            </a:extLst>
+          </p:cNvPr>
+          <p:cNvSpPr/>
+          <p:nvPr/>
+        </p:nvSpPr>
+        <p:spPr>
+          <a:xfrm>
+            <a:off x="4302017" y="2429939"/>
+            <a:ext cx="1174578" cy="654297"/>
+          </a:xfrm>
+          <a:prstGeom prst="rect">
+            <a:avLst/>
+          </a:prstGeom>
+          <a:solidFill>
+            <a:schemeClr val="bg1"/>
+          </a:solidFill>
+          <a:ln>
+            <a:noFill/>
+          </a:ln>
+        </p:spPr>
+        <p:style>
+          <a:lnRef idx="2">
+            <a:schemeClr val="accent1">
+              <a:shade val="50000"/>
+            </a:schemeClr>
+          </a:lnRef>
+          <a:fillRef idx="1">
+            <a:schemeClr val="accent1"/>
+          </a:fillRef>
+          <a:effectRef idx="0">
+            <a:schemeClr val="accent1"/>
+          </a:effectRef>
+          <a:fontRef idx="minor">
+            <a:schemeClr val="lt1"/>
+          </a:fontRef>
+        </p:style>
+        <p:txBody>
+          <a:bodyPr rtlCol="0" anchor="ctr"/>
+          <a:lstStyle/>
+          <a:p>
+            <a:pPr algn="ctr"/>
+            <a:endParaRPr lang="en-US"/>
+          </a:p>
+        </p:txBody>
+      </p:sp>
+      <p:grpSp>
+        <p:nvGrpSpPr>
           <p:cNvPr id="4" name="Group 3">
             <a:extLst>
               <a:ext uri="{FF2B5EF4-FFF2-40B4-BE49-F238E27FC236}">
@@ -2987,8 +3130,8 @@
         </p:nvGrpSpPr>
         <p:grpSpPr>
           <a:xfrm>
-            <a:off x="3632131" y="19677"/>
-            <a:ext cx="3207439" cy="4370252"/>
+            <a:off x="3495007" y="19677"/>
+            <a:ext cx="3344564" cy="4370252"/>
             <a:chOff x="412729" y="5797035"/>
             <a:chExt cx="2538828" cy="1510990"/>
           </a:xfrm>
@@ -3124,8 +3267,8 @@
         </p:nvGrpSpPr>
         <p:grpSpPr>
           <a:xfrm>
-            <a:off x="1363909" y="19677"/>
-            <a:ext cx="2201909" cy="4370252"/>
+            <a:off x="1318759" y="19677"/>
+            <a:ext cx="2144065" cy="4370252"/>
             <a:chOff x="412729" y="5797035"/>
             <a:chExt cx="2538828" cy="1510990"/>
           </a:xfrm>
@@ -3320,7 +3463,7 @@
             <a:lstStyle/>
             <a:p>
               <a:pPr algn="ctr"/>
-              <a:endParaRPr lang="en-US" sz="445"/>
+              <a:endParaRPr lang="en-US" sz="445" dirty="0"/>
             </a:p>
           </p:txBody>
         </p:sp>
@@ -3384,170 +3527,6 @@
           </p:txBody>
         </p:sp>
       </p:grpSp>
-      <p:grpSp>
-        <p:nvGrpSpPr>
-          <p:cNvPr id="98" name="Group 97">
-            <a:extLst>
-              <a:ext uri="{FF2B5EF4-FFF2-40B4-BE49-F238E27FC236}">
-                <a16:creationId xmlns:a16="http://schemas.microsoft.com/office/drawing/2014/main" id="{79A86437-AD79-2868-8A7E-9C881303822D}"/>
-              </a:ext>
-            </a:extLst>
-          </p:cNvPr>
-          <p:cNvGrpSpPr/>
-          <p:nvPr/>
-        </p:nvGrpSpPr>
-        <p:grpSpPr>
-          <a:xfrm>
-            <a:off x="4302017" y="2379137"/>
-            <a:ext cx="2453379" cy="1968550"/>
-            <a:chOff x="4302017" y="2379137"/>
-            <a:chExt cx="2453379" cy="1968550"/>
-          </a:xfrm>
-        </p:grpSpPr>
-        <p:grpSp>
-          <p:nvGrpSpPr>
-            <p:cNvPr id="30" name="Group 29">
-              <a:extLst>
-                <a:ext uri="{FF2B5EF4-FFF2-40B4-BE49-F238E27FC236}">
-                  <a16:creationId xmlns:a16="http://schemas.microsoft.com/office/drawing/2014/main" id="{E1676347-F4E2-38FD-8C33-AABE8E5E4811}"/>
-                </a:ext>
-              </a:extLst>
-            </p:cNvPr>
-            <p:cNvGrpSpPr/>
-            <p:nvPr/>
-          </p:nvGrpSpPr>
-          <p:grpSpPr>
-            <a:xfrm>
-              <a:off x="4304322" y="2494401"/>
-              <a:ext cx="2451074" cy="1853286"/>
-              <a:chOff x="4645042" y="2543704"/>
-              <a:chExt cx="2165353" cy="1637249"/>
-            </a:xfrm>
-          </p:grpSpPr>
-          <p:pic>
-            <p:nvPicPr>
-              <p:cNvPr id="40" name="Graphic 39">
-                <a:extLst>
-                  <a:ext uri="{FF2B5EF4-FFF2-40B4-BE49-F238E27FC236}">
-                    <a16:creationId xmlns:a16="http://schemas.microsoft.com/office/drawing/2014/main" id="{1261CEDD-11B7-6E41-891F-2C0CFD11EDD9}"/>
-                  </a:ext>
-                </a:extLst>
-              </p:cNvPr>
-              <p:cNvPicPr>
-                <a:picLocks noChangeAspect="1"/>
-              </p:cNvPicPr>
-              <p:nvPr/>
-            </p:nvPicPr>
-            <p:blipFill rotWithShape="1">
-              <a:blip r:embed="rId2">
-                <a:extLst>
-                  <a:ext uri="{96DAC541-7B7A-43D3-8B79-37D633B846F1}">
-                    <asvg:svgBlip xmlns:asvg="http://schemas.microsoft.com/office/drawing/2016/SVG/main" r:embed="rId3"/>
-                  </a:ext>
-                </a:extLst>
-              </a:blip>
-              <a:srcRect t="9504" b="12568"/>
-              <a:stretch/>
-            </p:blipFill>
-            <p:spPr>
-              <a:xfrm>
-                <a:off x="4645042" y="2543704"/>
-                <a:ext cx="2164206" cy="1533200"/>
-              </a:xfrm>
-              <a:prstGeom prst="rect">
-                <a:avLst/>
-              </a:prstGeom>
-            </p:spPr>
-          </p:pic>
-          <p:pic>
-            <p:nvPicPr>
-              <p:cNvPr id="29" name="Graphic 28">
-                <a:extLst>
-                  <a:ext uri="{FF2B5EF4-FFF2-40B4-BE49-F238E27FC236}">
-                    <a16:creationId xmlns:a16="http://schemas.microsoft.com/office/drawing/2014/main" id="{D529A0F8-7D27-B311-974A-468A314CFCBC}"/>
-                  </a:ext>
-                </a:extLst>
-              </p:cNvPr>
-              <p:cNvPicPr>
-                <a:picLocks noChangeAspect="1"/>
-              </p:cNvPicPr>
-              <p:nvPr/>
-            </p:nvPicPr>
-            <p:blipFill rotWithShape="1">
-              <a:blip r:embed="rId2">
-                <a:extLst>
-                  <a:ext uri="{96DAC541-7B7A-43D3-8B79-37D633B846F1}">
-                    <asvg:svgBlip xmlns:asvg="http://schemas.microsoft.com/office/drawing/2016/SVG/main" r:embed="rId3"/>
-                  </a:ext>
-                </a:extLst>
-              </a:blip>
-              <a:srcRect t="87417"/>
-              <a:stretch/>
-            </p:blipFill>
-            <p:spPr>
-              <a:xfrm>
-                <a:off x="4646189" y="3933380"/>
-                <a:ext cx="2164206" cy="247573"/>
-              </a:xfrm>
-              <a:prstGeom prst="rect">
-                <a:avLst/>
-              </a:prstGeom>
-            </p:spPr>
-          </p:pic>
-        </p:grpSp>
-        <p:sp>
-          <p:nvSpPr>
-            <p:cNvPr id="94" name="Rectangle 93">
-              <a:extLst>
-                <a:ext uri="{FF2B5EF4-FFF2-40B4-BE49-F238E27FC236}">
-                  <a16:creationId xmlns:a16="http://schemas.microsoft.com/office/drawing/2014/main" id="{7E41B22A-7799-A438-5F15-053CBABEE426}"/>
-                </a:ext>
-              </a:extLst>
-            </p:cNvPr>
-            <p:cNvSpPr/>
-            <p:nvPr/>
-          </p:nvSpPr>
-          <p:spPr>
-            <a:xfrm>
-              <a:off x="4302017" y="2379137"/>
-              <a:ext cx="1174578" cy="654297"/>
-            </a:xfrm>
-            <a:prstGeom prst="rect">
-              <a:avLst/>
-            </a:prstGeom>
-            <a:solidFill>
-              <a:schemeClr val="bg1"/>
-            </a:solidFill>
-            <a:ln>
-              <a:noFill/>
-            </a:ln>
-          </p:spPr>
-          <p:style>
-            <a:lnRef idx="2">
-              <a:schemeClr val="accent1">
-                <a:shade val="50000"/>
-              </a:schemeClr>
-            </a:lnRef>
-            <a:fillRef idx="1">
-              <a:schemeClr val="accent1"/>
-            </a:fillRef>
-            <a:effectRef idx="0">
-              <a:schemeClr val="accent1"/>
-            </a:effectRef>
-            <a:fontRef idx="minor">
-              <a:schemeClr val="lt1"/>
-            </a:fontRef>
-          </p:style>
-          <p:txBody>
-            <a:bodyPr rtlCol="0" anchor="ctr"/>
-            <a:lstStyle/>
-            <a:p>
-              <a:pPr algn="ctr"/>
-              <a:endParaRPr lang="en-US"/>
-            </a:p>
-          </p:txBody>
-        </p:sp>
-      </p:grpSp>
       <p:pic>
         <p:nvPicPr>
           <p:cNvPr id="9" name="Picture 8">
@@ -3563,13 +3542,13 @@
           <p:nvPr/>
         </p:nvPicPr>
         <p:blipFill rotWithShape="1">
-          <a:blip r:embed="rId4"/>
+          <a:blip r:embed="rId6"/>
           <a:srcRect l="16380" t="19406" r="13693" b="19021"/>
           <a:stretch/>
         </p:blipFill>
         <p:spPr>
           <a:xfrm>
-            <a:off x="3592337" y="1848081"/>
+            <a:off x="3464148" y="1898070"/>
             <a:ext cx="1787149" cy="1573638"/>
           </a:xfrm>
           <a:prstGeom prst="rect">
@@ -3591,8 +3570,8 @@
         </p:nvSpPr>
         <p:spPr>
           <a:xfrm>
-            <a:off x="3638523" y="1609046"/>
-            <a:ext cx="1612316" cy="307777"/>
+            <a:off x="3461906" y="1581058"/>
+            <a:ext cx="1544274" cy="415498"/>
           </a:xfrm>
           <a:prstGeom prst="rect">
             <a:avLst/>
@@ -3607,15 +3586,31 @@
           <a:p>
             <a:r>
               <a:rPr lang="en-US" sz="700" b="1" dirty="0"/>
-              <a:t>c2) </a:t>
+              <a:t>c2) Nodes from s</a:t>
+            </a:r>
+            <a:r>
+              <a:rPr lang="en-US" sz="700" dirty="0"/>
+              <a:t>ource chronogram      </a:t>
+            </a:r>
+          </a:p>
+          <a:p>
+            <a:r>
+              <a:rPr lang="en-US" sz="700" dirty="0"/>
+              <a:t>       are </a:t>
             </a:r>
             <a:r>
               <a:rPr lang="en-US" sz="700" b="1" dirty="0" err="1"/>
-              <a:t>Congruify</a:t>
+              <a:t>congruified</a:t>
             </a:r>
             <a:r>
               <a:rPr lang="en-US" sz="700" dirty="0"/>
-              <a:t> source chronogram nodes to nodes of tree topology.</a:t>
+              <a:t> to nodes in the    </a:t>
+            </a:r>
+          </a:p>
+          <a:p>
+            <a:r>
+              <a:rPr lang="en-US" sz="700" dirty="0"/>
+              <a:t>       tree topology:</a:t>
             </a:r>
           </a:p>
         </p:txBody>
@@ -3634,8 +3629,8 @@
         </p:nvSpPr>
         <p:spPr>
           <a:xfrm>
-            <a:off x="3586068" y="409929"/>
-            <a:ext cx="1442331" cy="200055"/>
+            <a:off x="3471627" y="411635"/>
+            <a:ext cx="2229926" cy="200055"/>
           </a:xfrm>
           <a:prstGeom prst="rect">
             <a:avLst/>
@@ -3654,11 +3649,15 @@
             </a:r>
             <a:r>
               <a:rPr lang="en-US" sz="700" dirty="0"/>
-              <a:t>Choose a </a:t>
+              <a:t>A </a:t>
             </a:r>
             <a:r>
               <a:rPr lang="en-US" sz="700" b="1" dirty="0"/>
-              <a:t>tree topology.</a:t>
+              <a:t>tree topology </a:t>
+            </a:r>
+            <a:r>
+              <a:rPr lang="en-US" sz="700" dirty="0"/>
+              <a:t>of the taxa of interest is chosen:</a:t>
             </a:r>
           </a:p>
         </p:txBody>
@@ -3677,8 +3676,8 @@
         </p:nvSpPr>
         <p:spPr>
           <a:xfrm>
-            <a:off x="5280168" y="2513536"/>
-            <a:ext cx="1487428" cy="307777"/>
+            <a:off x="5141548" y="2436796"/>
+            <a:ext cx="1730728" cy="415498"/>
           </a:xfrm>
           <a:prstGeom prst="rect">
             <a:avLst/>
@@ -3693,15 +3692,15 @@
           <a:p>
             <a:r>
               <a:rPr lang="en-US" sz="700" b="1" dirty="0"/>
-              <a:t>c4) </a:t>
+              <a:t>c4) S</a:t>
             </a:r>
             <a:r>
               <a:rPr lang="en-US" sz="700" dirty="0"/>
-              <a:t>Use summary ages of congruent nodes to </a:t>
+              <a:t>ummary ages of congruent nodes are used as secondary calibrations to </a:t>
             </a:r>
             <a:r>
               <a:rPr lang="en-US" sz="700" b="1" dirty="0"/>
-              <a:t>date a tree topology.</a:t>
+              <a:t>date a tree topology:</a:t>
             </a:r>
           </a:p>
         </p:txBody>
@@ -3721,10 +3720,10 @@
           <p:nvPr/>
         </p:nvPicPr>
         <p:blipFill>
-          <a:blip r:embed="rId5">
+          <a:blip r:embed="rId7">
             <a:extLst>
               <a:ext uri="{96DAC541-7B7A-43D3-8B79-37D633B846F1}">
-                <asvg:svgBlip xmlns:asvg="http://schemas.microsoft.com/office/drawing/2016/SVG/main" r:embed="rId6"/>
+                <asvg:svgBlip xmlns:asvg="http://schemas.microsoft.com/office/drawing/2016/SVG/main" r:embed="rId8"/>
               </a:ext>
             </a:extLst>
           </a:blip>
@@ -3734,7 +3733,7 @@
         </p:blipFill>
         <p:spPr>
           <a:xfrm>
-            <a:off x="4861485" y="48377"/>
+            <a:off x="4893146" y="106049"/>
             <a:ext cx="1891262" cy="1891262"/>
           </a:xfrm>
           <a:prstGeom prst="rect">
@@ -3756,7 +3755,7 @@
         </p:nvGrpSpPr>
         <p:grpSpPr>
           <a:xfrm>
-            <a:off x="4544051" y="1098136"/>
+            <a:off x="4424299" y="1198868"/>
             <a:ext cx="435765" cy="428859"/>
             <a:chOff x="10386505" y="7974231"/>
             <a:chExt cx="1706127" cy="1679086"/>
@@ -3831,11 +3830,11 @@
             <p:nvPr/>
           </p:nvPicPr>
           <p:blipFill>
-            <a:blip r:embed="rId7">
+            <a:blip r:embed="rId9">
               <a:extLst>
                 <a:ext uri="{BEBA8EAE-BF5A-486C-A8C5-ECC9F3942E4B}">
                   <a14:imgProps xmlns:a14="http://schemas.microsoft.com/office/drawing/2010/main">
-                    <a14:imgLayer r:embed="rId8">
+                    <a14:imgLayer r:embed="rId10">
                       <a14:imgEffect>
                         <a14:brightnessContrast contrast="-40000"/>
                       </a14:imgEffect>
@@ -3887,7 +3886,7 @@
         </p:nvSpPr>
         <p:spPr>
           <a:xfrm>
-            <a:off x="64788" y="829542"/>
+            <a:off x="17720" y="846977"/>
             <a:ext cx="1273817" cy="1304588"/>
           </a:xfrm>
           <a:prstGeom prst="rect">
@@ -3979,8 +3978,8 @@
         </p:nvSpPr>
         <p:spPr>
           <a:xfrm>
-            <a:off x="-20592" y="2129941"/>
-            <a:ext cx="1300841" cy="630942"/>
+            <a:off x="-29059" y="2147376"/>
+            <a:ext cx="1378930" cy="630942"/>
           </a:xfrm>
           <a:prstGeom prst="rect">
             <a:avLst/>
@@ -3999,33 +3998,57 @@
             </a:r>
             <a:r>
               <a:rPr lang="en-US" sz="700" dirty="0"/>
-              <a:t>Process taxon names with </a:t>
+              <a:t>Taxon names are processed </a:t>
+            </a:r>
+          </a:p>
+          <a:p>
+            <a:r>
+              <a:rPr lang="en-US" sz="700" dirty="0"/>
+              <a:t>       using the Taxonomic Name </a:t>
+            </a:r>
+          </a:p>
+          <a:p>
+            <a:r>
+              <a:rPr lang="en-US" sz="700" dirty="0"/>
+              <a:t>       Resolution Service (</a:t>
             </a:r>
             <a:r>
               <a:rPr lang="en-US" sz="700" b="1" dirty="0"/>
-              <a:t>TNRS</a:t>
+              <a:t>TNRS)</a:t>
             </a:r>
             <a:r>
               <a:rPr lang="en-US" sz="700" dirty="0"/>
-              <a:t> and </a:t>
+              <a:t> </a:t>
+            </a:r>
+          </a:p>
+          <a:p>
+            <a:r>
+              <a:rPr lang="en-US" sz="700" dirty="0"/>
+              <a:t>       and are </a:t>
             </a:r>
             <a:r>
               <a:rPr lang="en-US" sz="700" b="1" dirty="0"/>
-              <a:t>standardize</a:t>
+              <a:t>standardized</a:t>
             </a:r>
             <a:r>
               <a:rPr lang="en-US" sz="700" dirty="0"/>
-              <a:t> to a taxonomy. In this example, 4 names are synonyms in the standardized taxonomy (bold):</a:t>
+              <a:t> to a    </a:t>
+            </a:r>
+          </a:p>
+          <a:p>
+            <a:r>
+              <a:rPr lang="en-US" sz="700" dirty="0"/>
+              <a:t>       taxonomy:</a:t>
             </a:r>
           </a:p>
         </p:txBody>
       </p:sp>
       <p:grpSp>
         <p:nvGrpSpPr>
-          <p:cNvPr id="134" name="Group 133">
+          <p:cNvPr id="68" name="Group 67">
             <a:extLst>
               <a:ext uri="{FF2B5EF4-FFF2-40B4-BE49-F238E27FC236}">
-                <a16:creationId xmlns:a16="http://schemas.microsoft.com/office/drawing/2014/main" id="{AE709E57-87A7-8746-BDED-FE896E621DEC}"/>
+                <a16:creationId xmlns:a16="http://schemas.microsoft.com/office/drawing/2014/main" id="{4E991D17-9BFF-1D35-8369-85E41F2B9FD8}"/>
               </a:ext>
             </a:extLst>
           </p:cNvPr>
@@ -4034,18 +4057,18 @@
         </p:nvGrpSpPr>
         <p:grpSpPr>
           <a:xfrm>
-            <a:off x="2406985" y="2032758"/>
-            <a:ext cx="1005511" cy="792956"/>
-            <a:chOff x="347050" y="4140009"/>
-            <a:chExt cx="2145091" cy="1691640"/>
+            <a:off x="2407424" y="2674338"/>
+            <a:ext cx="1002640" cy="784206"/>
+            <a:chOff x="2410265" y="2667117"/>
+            <a:chExt cx="1002640" cy="784206"/>
           </a:xfrm>
         </p:grpSpPr>
         <p:sp>
           <p:nvSpPr>
-            <p:cNvPr id="135" name="Rounded Rectangle 134">
+            <p:cNvPr id="67" name="Rounded Rectangle 66">
               <a:extLst>
                 <a:ext uri="{FF2B5EF4-FFF2-40B4-BE49-F238E27FC236}">
-                  <a16:creationId xmlns:a16="http://schemas.microsoft.com/office/drawing/2014/main" id="{D8549988-4248-B648-80CE-CD62D9C40C3E}"/>
+                  <a16:creationId xmlns:a16="http://schemas.microsoft.com/office/drawing/2014/main" id="{28515ED7-9434-F570-658D-0CC615116B95}"/>
                 </a:ext>
               </a:extLst>
             </p:cNvPr>
@@ -4054,14 +4077,14 @@
           </p:nvSpPr>
           <p:spPr>
             <a:xfrm>
-              <a:off x="347050" y="4140009"/>
-              <a:ext cx="2128684" cy="1691640"/>
+              <a:off x="2410265" y="2667117"/>
+              <a:ext cx="997821" cy="784206"/>
             </a:xfrm>
             <a:prstGeom prst="roundRect">
               <a:avLst/>
             </a:prstGeom>
             <a:solidFill>
-              <a:srgbClr val="456CE3">
+              <a:srgbClr val="D23004">
                 <a:alpha val="69804"/>
               </a:srgbClr>
             </a:solidFill>
@@ -4111,15 +4134,15 @@
             <p:nvPr/>
           </p:nvPicPr>
           <p:blipFill>
-            <a:blip r:embed="rId9"/>
+            <a:blip r:embed="rId11"/>
             <a:stretch>
               <a:fillRect/>
             </a:stretch>
           </p:blipFill>
           <p:spPr>
             <a:xfrm>
-              <a:off x="434741" y="4269374"/>
-              <a:ext cx="2057400" cy="1428750"/>
+              <a:off x="2448499" y="2725357"/>
+              <a:ext cx="964406" cy="669726"/>
             </a:xfrm>
             <a:prstGeom prst="rect">
               <a:avLst/>
@@ -4141,7 +4164,7 @@
         </p:nvSpPr>
         <p:spPr>
           <a:xfrm>
-            <a:off x="24088" y="2876250"/>
+            <a:off x="-22980" y="2721359"/>
             <a:ext cx="1329935" cy="1304588"/>
           </a:xfrm>
           <a:prstGeom prst="rect">
@@ -4212,8 +4235,8 @@
         </p:nvSpPr>
         <p:spPr>
           <a:xfrm>
-            <a:off x="2529" y="487855"/>
-            <a:ext cx="1387778" cy="415498"/>
+            <a:off x="2529" y="420620"/>
+            <a:ext cx="1504266" cy="523220"/>
           </a:xfrm>
           <a:prstGeom prst="rect">
             <a:avLst/>
@@ -4232,7 +4255,7 @@
             </a:r>
             <a:r>
               <a:rPr lang="en-US" sz="700" dirty="0"/>
-              <a:t>User provides a list of </a:t>
+              <a:t>A list of </a:t>
             </a:r>
             <a:r>
               <a:rPr lang="en-US" sz="700" b="1" dirty="0"/>
@@ -4240,7 +4263,33 @@
             </a:r>
             <a:r>
               <a:rPr lang="en-US" sz="700" dirty="0"/>
-              <a:t>, as a character string or as a tree:</a:t>
+              <a:t> is </a:t>
+            </a:r>
+          </a:p>
+          <a:p>
+            <a:r>
+              <a:rPr lang="en-US" sz="700" dirty="0"/>
+              <a:t>      provided by the user</a:t>
+            </a:r>
+            <a:r>
+              <a:rPr lang="en-US" sz="700" b="1" dirty="0"/>
+              <a:t>.</a:t>
+            </a:r>
+            <a:r>
+              <a:rPr lang="en-US" sz="700" dirty="0"/>
+              <a:t> It can </a:t>
+            </a:r>
+          </a:p>
+          <a:p>
+            <a:r>
+              <a:rPr lang="en-US" sz="700" dirty="0"/>
+              <a:t>      contain synonyms and </a:t>
+            </a:r>
+          </a:p>
+          <a:p>
+            <a:r>
+              <a:rPr lang="en-US" sz="700" dirty="0"/>
+              <a:t>      misspellings:</a:t>
             </a:r>
           </a:p>
         </p:txBody>
@@ -4259,8 +4308,8 @@
         </p:nvSpPr>
         <p:spPr>
           <a:xfrm>
-            <a:off x="2441769" y="433913"/>
-            <a:ext cx="1124050" cy="415498"/>
+            <a:off x="1271365" y="2594438"/>
+            <a:ext cx="1247083" cy="415498"/>
           </a:xfrm>
           <a:prstGeom prst="rect">
             <a:avLst/>
@@ -4279,16 +4328,13 @@
             </a:r>
             <a:r>
               <a:rPr lang="en-US" sz="700" dirty="0"/>
-              <a:t>Prune matching chronograms and save as </a:t>
+              <a:t>Matching chronograms are pruned and saved as </a:t>
             </a:r>
             <a:r>
               <a:rPr lang="en-US" sz="700" b="1" dirty="0"/>
-              <a:t>source chronograms</a:t>
-            </a:r>
-            <a:r>
-              <a:rPr lang="en-US" sz="700" dirty="0"/>
-              <a:t>.</a:t>
-            </a:r>
+              <a:t>source chronograms:</a:t>
+            </a:r>
+            <a:endParaRPr lang="en-US" sz="700" dirty="0"/>
           </a:p>
         </p:txBody>
       </p:sp>
@@ -4307,13 +4353,13 @@
           <p:nvPr/>
         </p:nvPicPr>
         <p:blipFill rotWithShape="1">
-          <a:blip r:embed="rId10"/>
+          <a:blip r:embed="rId12"/>
           <a:srcRect l="220" t="13022" r="46397" b="30463"/>
           <a:stretch/>
         </p:blipFill>
         <p:spPr>
           <a:xfrm>
-            <a:off x="1506795" y="2879116"/>
+            <a:off x="2508751" y="1723252"/>
             <a:ext cx="414177" cy="177128"/>
           </a:xfrm>
           <a:prstGeom prst="rect">
@@ -4335,8 +4381,8 @@
         </p:nvSpPr>
         <p:spPr>
           <a:xfrm>
-            <a:off x="1329817" y="411905"/>
-            <a:ext cx="1127603" cy="523220"/>
+            <a:off x="1292991" y="413013"/>
+            <a:ext cx="2247507" cy="307777"/>
           </a:xfrm>
           <a:prstGeom prst="rect">
             <a:avLst/>
@@ -4351,19 +4397,25 @@
           <a:p>
             <a:r>
               <a:rPr lang="en-US" sz="700" b="1" dirty="0"/>
-              <a:t>b1) </a:t>
+              <a:t>b1) Processed taxon names</a:t>
             </a:r>
             <a:r>
               <a:rPr lang="en-US" sz="700" dirty="0"/>
-              <a:t>Search </a:t>
-            </a:r>
-            <a:r>
-              <a:rPr lang="en-US" sz="700" b="1" dirty="0"/>
-              <a:t>processed taxon names</a:t>
-            </a:r>
+              <a:t> are searched in </a:t>
+            </a:r>
+          </a:p>
+          <a:p>
             <a:r>
               <a:rPr lang="en-US" sz="700" dirty="0"/>
-              <a:t> in chronogram database and identify (</a:t>
+              <a:t>       </a:t>
+            </a:r>
+            <a:r>
+              <a:rPr lang="en-US" sz="700" dirty="0" err="1"/>
+              <a:t>DateLife’s</a:t>
+            </a:r>
+            <a:r>
+              <a:rPr lang="en-US" sz="700" dirty="0"/>
+              <a:t> chronogram database and identified (</a:t>
             </a:r>
             <a:r>
               <a:rPr lang="en-US" sz="700" dirty="0">
@@ -4375,7 +4427,7 @@
             </a:r>
             <a:r>
               <a:rPr lang="en-US" sz="700" dirty="0"/>
-              <a:t>). </a:t>
+              <a:t>):</a:t>
             </a:r>
           </a:p>
         </p:txBody>
@@ -4439,7 +4491,7 @@
           <p:nvPr/>
         </p:nvPicPr>
         <p:blipFill rotWithShape="1">
-          <a:blip r:embed="rId11"/>
+          <a:blip r:embed="rId13"/>
           <a:srcRect t="8072" r="60585" b="17934"/>
           <a:stretch/>
         </p:blipFill>
@@ -4468,7 +4520,7 @@
           <p:nvPr/>
         </p:nvPicPr>
         <p:blipFill rotWithShape="1">
-          <a:blip r:embed="rId12"/>
+          <a:blip r:embed="rId14"/>
           <a:srcRect t="8072" r="60585" b="17934"/>
           <a:stretch/>
         </p:blipFill>
@@ -4497,13 +4549,13 @@
           <p:nvPr/>
         </p:nvPicPr>
         <p:blipFill rotWithShape="1">
-          <a:blip r:embed="rId13"/>
+          <a:blip r:embed="rId15"/>
           <a:srcRect t="8072" r="60585" b="17934"/>
           <a:stretch/>
         </p:blipFill>
         <p:spPr>
           <a:xfrm>
-            <a:off x="1798197" y="2125348"/>
+            <a:off x="2261100" y="1473350"/>
             <a:ext cx="239603" cy="667213"/>
           </a:xfrm>
           <a:prstGeom prst="rect">
@@ -4526,13 +4578,13 @@
           <p:nvPr/>
         </p:nvPicPr>
         <p:blipFill rotWithShape="1">
-          <a:blip r:embed="rId14"/>
+          <a:blip r:embed="rId16"/>
           <a:srcRect t="8072" r="60585" b="17934"/>
           <a:stretch/>
         </p:blipFill>
         <p:spPr>
           <a:xfrm>
-            <a:off x="1435754" y="3078917"/>
+            <a:off x="2591949" y="936744"/>
             <a:ext cx="284428" cy="792035"/>
           </a:xfrm>
           <a:prstGeom prst="rect">
@@ -4555,7 +4607,7 @@
           <p:nvPr/>
         </p:nvPicPr>
         <p:blipFill rotWithShape="1">
-          <a:blip r:embed="rId15"/>
+          <a:blip r:embed="rId17"/>
           <a:srcRect l="31349" t="16187" r="45578" b="27268"/>
           <a:stretch/>
         </p:blipFill>
@@ -4584,13 +4636,13 @@
           <p:nvPr/>
         </p:nvPicPr>
         <p:blipFill rotWithShape="1">
-          <a:blip r:embed="rId16"/>
+          <a:blip r:embed="rId18"/>
           <a:srcRect l="5959" t="39310" r="60585" b="17934"/>
           <a:stretch/>
         </p:blipFill>
         <p:spPr>
           <a:xfrm>
-            <a:off x="1448616" y="3975082"/>
+            <a:off x="2189052" y="1165809"/>
             <a:ext cx="341987" cy="174726"/>
           </a:xfrm>
           <a:prstGeom prst="rect">
@@ -4613,13 +4665,13 @@
           <p:nvPr/>
         </p:nvPicPr>
         <p:blipFill rotWithShape="1">
-          <a:blip r:embed="rId17"/>
+          <a:blip r:embed="rId19"/>
           <a:srcRect t="9678" r="61676" b="16720"/>
           <a:stretch/>
         </p:blipFill>
         <p:spPr>
           <a:xfrm>
-            <a:off x="1699622" y="3296365"/>
+            <a:off x="2828845" y="868325"/>
             <a:ext cx="341987" cy="630946"/>
           </a:xfrm>
           <a:prstGeom prst="rect">
@@ -4641,7 +4693,7 @@
         </p:nvSpPr>
         <p:spPr>
           <a:xfrm>
-            <a:off x="1781326" y="2176139"/>
+            <a:off x="1756254" y="2210135"/>
             <a:ext cx="248786" cy="246221"/>
           </a:xfrm>
           <a:prstGeom prst="rect">
@@ -4705,6 +4757,113 @@
           </a:p>
         </p:txBody>
       </p:sp>
+      <p:grpSp>
+        <p:nvGrpSpPr>
+          <p:cNvPr id="66" name="Group 65">
+            <a:extLst>
+              <a:ext uri="{FF2B5EF4-FFF2-40B4-BE49-F238E27FC236}">
+                <a16:creationId xmlns:a16="http://schemas.microsoft.com/office/drawing/2014/main" id="{ECA716A2-E1CE-CC53-F33E-9E9AAE6B259D}"/>
+              </a:ext>
+            </a:extLst>
+          </p:cNvPr>
+          <p:cNvGrpSpPr/>
+          <p:nvPr/>
+        </p:nvGrpSpPr>
+        <p:grpSpPr>
+          <a:xfrm>
+            <a:off x="1364466" y="3032122"/>
+            <a:ext cx="997820" cy="676656"/>
+            <a:chOff x="1338768" y="3030316"/>
+            <a:chExt cx="997820" cy="676656"/>
+          </a:xfrm>
+        </p:grpSpPr>
+        <p:sp>
+          <p:nvSpPr>
+            <p:cNvPr id="64" name="Rounded Rectangle 63">
+              <a:extLst>
+                <a:ext uri="{FF2B5EF4-FFF2-40B4-BE49-F238E27FC236}">
+                  <a16:creationId xmlns:a16="http://schemas.microsoft.com/office/drawing/2014/main" id="{265A40A3-4981-7D22-3BD2-FD53601693B0}"/>
+                </a:ext>
+              </a:extLst>
+            </p:cNvPr>
+            <p:cNvSpPr/>
+            <p:nvPr/>
+          </p:nvSpPr>
+          <p:spPr>
+            <a:xfrm>
+              <a:off x="1338768" y="3030316"/>
+              <a:ext cx="997820" cy="676656"/>
+            </a:xfrm>
+            <a:prstGeom prst="roundRect">
+              <a:avLst/>
+            </a:prstGeom>
+            <a:solidFill>
+              <a:srgbClr val="456CE3">
+                <a:alpha val="69804"/>
+              </a:srgbClr>
+            </a:solidFill>
+          </p:spPr>
+          <p:style>
+            <a:lnRef idx="2">
+              <a:schemeClr val="accent1">
+                <a:shade val="50000"/>
+              </a:schemeClr>
+            </a:lnRef>
+            <a:fillRef idx="1">
+              <a:schemeClr val="accent1"/>
+            </a:fillRef>
+            <a:effectRef idx="0">
+              <a:schemeClr val="accent1"/>
+            </a:effectRef>
+            <a:fontRef idx="minor">
+              <a:schemeClr val="lt1"/>
+            </a:fontRef>
+          </p:style>
+          <p:txBody>
+            <a:bodyPr rot="0" spcFirstLastPara="0" vertOverflow="overflow" horzOverflow="overflow" vert="horz" wrap="square" lIns="42863" tIns="21431" rIns="42863" bIns="21431" numCol="1" spcCol="0" rtlCol="0" fromWordArt="0" anchor="ctr" anchorCtr="0" forceAA="0" compatLnSpc="1">
+              <a:prstTxWarp prst="textNoShape">
+                <a:avLst/>
+              </a:prstTxWarp>
+              <a:noAutofit/>
+            </a:bodyPr>
+            <a:lstStyle/>
+            <a:p>
+              <a:pPr algn="ctr"/>
+              <a:endParaRPr lang="en-US" sz="406" dirty="0"/>
+            </a:p>
+          </p:txBody>
+        </p:sp>
+        <p:pic>
+          <p:nvPicPr>
+            <p:cNvPr id="101" name="Picture 100">
+              <a:extLst>
+                <a:ext uri="{FF2B5EF4-FFF2-40B4-BE49-F238E27FC236}">
+                  <a16:creationId xmlns:a16="http://schemas.microsoft.com/office/drawing/2014/main" id="{F720312D-F327-33D3-61B5-857DB938FC30}"/>
+                </a:ext>
+              </a:extLst>
+            </p:cNvPr>
+            <p:cNvPicPr>
+              <a:picLocks noChangeAspect="1"/>
+            </p:cNvPicPr>
+            <p:nvPr/>
+          </p:nvPicPr>
+          <p:blipFill>
+            <a:blip r:embed="rId20"/>
+            <a:stretch>
+              <a:fillRect/>
+            </a:stretch>
+          </p:blipFill>
+          <p:spPr>
+            <a:xfrm>
+              <a:off x="1361118" y="3035341"/>
+              <a:ext cx="964407" cy="669726"/>
+            </a:xfrm>
+            <a:prstGeom prst="rect">
+              <a:avLst/>
+            </a:prstGeom>
+          </p:spPr>
+        </p:pic>
+      </p:grpSp>
       <p:pic>
         <p:nvPicPr>
           <p:cNvPr id="87" name="Picture 86">
@@ -4720,13 +4879,13 @@
           <p:nvPr/>
         </p:nvPicPr>
         <p:blipFill rotWithShape="1">
-          <a:blip r:embed="rId15"/>
+          <a:blip r:embed="rId17"/>
           <a:srcRect l="31349" t="16187" r="45578" b="27268"/>
           <a:stretch/>
         </p:blipFill>
         <p:spPr>
           <a:xfrm rot="10800000">
-            <a:off x="1885583" y="4049534"/>
+            <a:off x="2906214" y="1993745"/>
             <a:ext cx="208835" cy="200551"/>
           </a:xfrm>
           <a:prstGeom prst="rect">
@@ -4749,7 +4908,7 @@
           <p:nvPr/>
         </p:nvPicPr>
         <p:blipFill rotWithShape="1">
-          <a:blip r:embed="rId16"/>
+          <a:blip r:embed="rId18"/>
           <a:srcRect l="5959" t="39310" r="60585" b="17934"/>
           <a:stretch/>
         </p:blipFill>
@@ -4757,36 +4916,6 @@
           <a:xfrm>
             <a:off x="1741862" y="1858032"/>
             <a:ext cx="341987" cy="174726"/>
-          </a:xfrm>
-          <a:prstGeom prst="rect">
-            <a:avLst/>
-          </a:prstGeom>
-        </p:spPr>
-      </p:pic>
-      <p:pic>
-        <p:nvPicPr>
-          <p:cNvPr id="89" name="Picture 88">
-            <a:extLst>
-              <a:ext uri="{FF2B5EF4-FFF2-40B4-BE49-F238E27FC236}">
-                <a16:creationId xmlns:a16="http://schemas.microsoft.com/office/drawing/2014/main" id="{6118B387-ABA7-8BF7-AE2F-E23BFB4E481C}"/>
-              </a:ext>
-            </a:extLst>
-          </p:cNvPr>
-          <p:cNvPicPr>
-            <a:picLocks noChangeAspect="1"/>
-          </p:cNvPicPr>
-          <p:nvPr/>
-        </p:nvPicPr>
-        <p:blipFill>
-          <a:blip r:embed="rId18"/>
-          <a:stretch>
-            <a:fillRect/>
-          </a:stretch>
-        </p:blipFill>
-        <p:spPr>
-          <a:xfrm flipH="1">
-            <a:off x="1395961" y="2413650"/>
-            <a:ext cx="420342" cy="360293"/>
           </a:xfrm>
           <a:prstGeom prst="rect">
             <a:avLst/>
@@ -4807,7 +4936,7 @@
         </p:nvGrpSpPr>
         <p:grpSpPr>
           <a:xfrm>
-            <a:off x="2410830" y="2925572"/>
+            <a:off x="2412243" y="3500313"/>
             <a:ext cx="997821" cy="792035"/>
             <a:chOff x="349831" y="5774256"/>
             <a:chExt cx="2128684" cy="1689674"/>
@@ -4884,7 +5013,7 @@
             <p:nvPr/>
           </p:nvPicPr>
           <p:blipFill>
-            <a:blip r:embed="rId19"/>
+            <a:blip r:embed="rId21"/>
             <a:stretch>
               <a:fillRect/>
             </a:stretch>
@@ -4990,10 +5119,10 @@
       </p:sp>
       <p:sp>
         <p:nvSpPr>
-          <p:cNvPr id="20" name="Right Arrow 19">
+          <p:cNvPr id="23" name="Right Arrow 22">
             <a:extLst>
               <a:ext uri="{FF2B5EF4-FFF2-40B4-BE49-F238E27FC236}">
-                <a16:creationId xmlns:a16="http://schemas.microsoft.com/office/drawing/2014/main" id="{7F39957E-D439-3160-7BFE-1D4235F11E5E}"/>
+                <a16:creationId xmlns:a16="http://schemas.microsoft.com/office/drawing/2014/main" id="{79072039-AF35-5341-79F8-C0A18D698826}"/>
               </a:ext>
             </a:extLst>
           </p:cNvPr>
@@ -5002,8 +5131,8 @@
         </p:nvSpPr>
         <p:spPr>
           <a:xfrm flipV="1">
-            <a:off x="2268610" y="578004"/>
-            <a:ext cx="190833" cy="111591"/>
+            <a:off x="4890378" y="1687014"/>
+            <a:ext cx="251170" cy="134245"/>
           </a:xfrm>
           <a:prstGeom prst="rightArrow">
             <a:avLst/>
@@ -5052,10 +5181,10 @@
       </p:sp>
       <p:sp>
         <p:nvSpPr>
-          <p:cNvPr id="23" name="Right Arrow 22">
+          <p:cNvPr id="24" name="Right Arrow 23">
             <a:extLst>
               <a:ext uri="{FF2B5EF4-FFF2-40B4-BE49-F238E27FC236}">
-                <a16:creationId xmlns:a16="http://schemas.microsoft.com/office/drawing/2014/main" id="{79072039-AF35-5341-79F8-C0A18D698826}"/>
+                <a16:creationId xmlns:a16="http://schemas.microsoft.com/office/drawing/2014/main" id="{38B429DF-A3A2-5B6F-5988-19355BD2C108}"/>
               </a:ext>
             </a:extLst>
           </p:cNvPr>
@@ -5063,9 +5192,9 @@
           <p:nvPr/>
         </p:nvSpPr>
         <p:spPr>
-          <a:xfrm flipV="1">
-            <a:off x="4995512" y="1702082"/>
-            <a:ext cx="283464" cy="109728"/>
+          <a:xfrm rot="5400000" flipV="1">
+            <a:off x="5030162" y="2150555"/>
+            <a:ext cx="477255" cy="95225"/>
           </a:xfrm>
           <a:prstGeom prst="rightArrow">
             <a:avLst/>
@@ -5114,237 +5243,6 @@
       </p:sp>
       <p:sp>
         <p:nvSpPr>
-          <p:cNvPr id="24" name="Right Arrow 23">
-            <a:extLst>
-              <a:ext uri="{FF2B5EF4-FFF2-40B4-BE49-F238E27FC236}">
-                <a16:creationId xmlns:a16="http://schemas.microsoft.com/office/drawing/2014/main" id="{38B429DF-A3A2-5B6F-5988-19355BD2C108}"/>
-              </a:ext>
-            </a:extLst>
-          </p:cNvPr>
-          <p:cNvSpPr/>
-          <p:nvPr/>
-        </p:nvSpPr>
-        <p:spPr>
-          <a:xfrm rot="5400000" flipV="1">
-            <a:off x="5986444" y="2362660"/>
-            <a:ext cx="192024" cy="109728"/>
-          </a:xfrm>
-          <a:prstGeom prst="rightArrow">
-            <a:avLst/>
-          </a:prstGeom>
-          <a:solidFill>
-            <a:schemeClr val="accent6">
-              <a:lumMod val="40000"/>
-              <a:lumOff val="60000"/>
-            </a:schemeClr>
-          </a:solidFill>
-          <a:ln>
-            <a:solidFill>
-              <a:srgbClr val="92D050"/>
-            </a:solidFill>
-          </a:ln>
-        </p:spPr>
-        <p:style>
-          <a:lnRef idx="2">
-            <a:schemeClr val="accent1">
-              <a:shade val="50000"/>
-            </a:schemeClr>
-          </a:lnRef>
-          <a:fillRef idx="1">
-            <a:schemeClr val="accent1"/>
-          </a:fillRef>
-          <a:effectRef idx="0">
-            <a:schemeClr val="accent1"/>
-          </a:effectRef>
-          <a:fontRef idx="minor">
-            <a:schemeClr val="lt1"/>
-          </a:fontRef>
-        </p:style>
-        <p:txBody>
-          <a:bodyPr rot="0" spcFirstLastPara="0" vertOverflow="overflow" horzOverflow="overflow" vert="horz" wrap="square" lIns="36522" tIns="18261" rIns="36522" bIns="18261" numCol="1" spcCol="0" rtlCol="0" fromWordArt="0" anchor="ctr" anchorCtr="0" forceAA="0" compatLnSpc="1">
-            <a:prstTxWarp prst="textNoShape">
-              <a:avLst/>
-            </a:prstTxWarp>
-            <a:noAutofit/>
-          </a:bodyPr>
-          <a:lstStyle/>
-          <a:p>
-            <a:pPr algn="ctr"/>
-            <a:endParaRPr lang="en-US" sz="445"/>
-          </a:p>
-        </p:txBody>
-      </p:sp>
-      <p:grpSp>
-        <p:nvGrpSpPr>
-          <p:cNvPr id="99" name="Group 98">
-            <a:extLst>
-              <a:ext uri="{FF2B5EF4-FFF2-40B4-BE49-F238E27FC236}">
-                <a16:creationId xmlns:a16="http://schemas.microsoft.com/office/drawing/2014/main" id="{241BD208-135E-7478-6979-39EDD3B85DE2}"/>
-              </a:ext>
-            </a:extLst>
-          </p:cNvPr>
-          <p:cNvGrpSpPr/>
-          <p:nvPr/>
-        </p:nvGrpSpPr>
-        <p:grpSpPr>
-          <a:xfrm>
-            <a:off x="2410830" y="1235396"/>
-            <a:ext cx="997821" cy="676165"/>
-            <a:chOff x="3095159" y="6869139"/>
-            <a:chExt cx="2128684" cy="1442486"/>
-          </a:xfrm>
-        </p:grpSpPr>
-        <p:sp>
-          <p:nvSpPr>
-            <p:cNvPr id="100" name="Rounded Rectangle 99">
-              <a:extLst>
-                <a:ext uri="{FF2B5EF4-FFF2-40B4-BE49-F238E27FC236}">
-                  <a16:creationId xmlns:a16="http://schemas.microsoft.com/office/drawing/2014/main" id="{75A271F4-0536-9520-8000-62F76A9F2D8A}"/>
-                </a:ext>
-              </a:extLst>
-            </p:cNvPr>
-            <p:cNvSpPr/>
-            <p:nvPr/>
-          </p:nvSpPr>
-          <p:spPr>
-            <a:xfrm>
-              <a:off x="3095159" y="6869139"/>
-              <a:ext cx="2128684" cy="1442486"/>
-            </a:xfrm>
-            <a:prstGeom prst="roundRect">
-              <a:avLst/>
-            </a:prstGeom>
-            <a:solidFill>
-              <a:srgbClr val="D23004">
-                <a:alpha val="69804"/>
-              </a:srgbClr>
-            </a:solidFill>
-          </p:spPr>
-          <p:style>
-            <a:lnRef idx="2">
-              <a:schemeClr val="accent1">
-                <a:shade val="50000"/>
-              </a:schemeClr>
-            </a:lnRef>
-            <a:fillRef idx="1">
-              <a:schemeClr val="accent1"/>
-            </a:fillRef>
-            <a:effectRef idx="0">
-              <a:schemeClr val="accent1"/>
-            </a:effectRef>
-            <a:fontRef idx="minor">
-              <a:schemeClr val="lt1"/>
-            </a:fontRef>
-          </p:style>
-          <p:txBody>
-            <a:bodyPr rot="0" spcFirstLastPara="0" vertOverflow="overflow" horzOverflow="overflow" vert="horz" wrap="square" lIns="42863" tIns="21431" rIns="42863" bIns="21431" numCol="1" spcCol="0" rtlCol="0" fromWordArt="0" anchor="ctr" anchorCtr="0" forceAA="0" compatLnSpc="1">
-              <a:prstTxWarp prst="textNoShape">
-                <a:avLst/>
-              </a:prstTxWarp>
-              <a:noAutofit/>
-            </a:bodyPr>
-            <a:lstStyle/>
-            <a:p>
-              <a:pPr algn="ctr"/>
-              <a:endParaRPr lang="en-US" sz="406" dirty="0"/>
-            </a:p>
-          </p:txBody>
-        </p:sp>
-        <p:pic>
-          <p:nvPicPr>
-            <p:cNvPr id="101" name="Picture 100">
-              <a:extLst>
-                <a:ext uri="{FF2B5EF4-FFF2-40B4-BE49-F238E27FC236}">
-                  <a16:creationId xmlns:a16="http://schemas.microsoft.com/office/drawing/2014/main" id="{F720312D-F327-33D3-61B5-857DB938FC30}"/>
-                </a:ext>
-              </a:extLst>
-            </p:cNvPr>
-            <p:cNvPicPr>
-              <a:picLocks noChangeAspect="1"/>
-            </p:cNvPicPr>
-            <p:nvPr/>
-          </p:nvPicPr>
-          <p:blipFill>
-            <a:blip r:embed="rId20"/>
-            <a:stretch>
-              <a:fillRect/>
-            </a:stretch>
-          </p:blipFill>
-          <p:spPr>
-            <a:xfrm>
-              <a:off x="3104106" y="6876007"/>
-              <a:ext cx="2057400" cy="1428750"/>
-            </a:xfrm>
-            <a:prstGeom prst="rect">
-              <a:avLst/>
-            </a:prstGeom>
-          </p:spPr>
-        </p:pic>
-      </p:grpSp>
-      <p:sp>
-        <p:nvSpPr>
-          <p:cNvPr id="25" name="Right Arrow 24">
-            <a:extLst>
-              <a:ext uri="{FF2B5EF4-FFF2-40B4-BE49-F238E27FC236}">
-                <a16:creationId xmlns:a16="http://schemas.microsoft.com/office/drawing/2014/main" id="{C6419ED5-71DD-6695-746A-29B13EE98DDD}"/>
-              </a:ext>
-            </a:extLst>
-          </p:cNvPr>
-          <p:cNvSpPr/>
-          <p:nvPr/>
-        </p:nvSpPr>
-        <p:spPr>
-          <a:xfrm rot="5400000" flipV="1">
-            <a:off x="-311217" y="1431677"/>
-            <a:ext cx="1015836" cy="110432"/>
-          </a:xfrm>
-          <a:prstGeom prst="rightArrow">
-            <a:avLst/>
-          </a:prstGeom>
-          <a:solidFill>
-            <a:schemeClr val="accent6">
-              <a:lumMod val="40000"/>
-              <a:lumOff val="60000"/>
-            </a:schemeClr>
-          </a:solidFill>
-          <a:ln>
-            <a:solidFill>
-              <a:srgbClr val="92D050"/>
-            </a:solidFill>
-          </a:ln>
-        </p:spPr>
-        <p:style>
-          <a:lnRef idx="2">
-            <a:schemeClr val="accent1">
-              <a:shade val="50000"/>
-            </a:schemeClr>
-          </a:lnRef>
-          <a:fillRef idx="1">
-            <a:schemeClr val="accent1"/>
-          </a:fillRef>
-          <a:effectRef idx="0">
-            <a:schemeClr val="accent1"/>
-          </a:effectRef>
-          <a:fontRef idx="minor">
-            <a:schemeClr val="lt1"/>
-          </a:fontRef>
-        </p:style>
-        <p:txBody>
-          <a:bodyPr rot="0" spcFirstLastPara="0" vertOverflow="overflow" horzOverflow="overflow" vert="horz" wrap="square" lIns="36522" tIns="18261" rIns="36522" bIns="18261" numCol="1" spcCol="0" rtlCol="0" fromWordArt="0" anchor="ctr" anchorCtr="0" forceAA="0" compatLnSpc="1">
-            <a:prstTxWarp prst="textNoShape">
-              <a:avLst/>
-            </a:prstTxWarp>
-            <a:noAutofit/>
-          </a:bodyPr>
-          <a:lstStyle/>
-          <a:p>
-            <a:pPr algn="ctr"/>
-            <a:endParaRPr lang="en-US" sz="445"/>
-          </a:p>
-        </p:txBody>
-      </p:sp>
-      <p:sp>
-        <p:nvSpPr>
           <p:cNvPr id="26" name="TextBox 25">
             <a:extLst>
               <a:ext uri="{FF2B5EF4-FFF2-40B4-BE49-F238E27FC236}">
@@ -5357,7 +5255,7 @@
         </p:nvSpPr>
         <p:spPr>
           <a:xfrm>
-            <a:off x="1910839" y="3977646"/>
+            <a:off x="3092861" y="1660183"/>
             <a:ext cx="248786" cy="246221"/>
           </a:xfrm>
           <a:prstGeom prst="rect">
@@ -5396,7 +5294,7 @@
         </p:nvGrpSpPr>
         <p:grpSpPr>
           <a:xfrm>
-            <a:off x="4426784" y="593092"/>
+            <a:off x="4385707" y="586849"/>
             <a:ext cx="648928" cy="369332"/>
             <a:chOff x="3861652" y="1150967"/>
             <a:chExt cx="648928" cy="369332"/>
@@ -5509,6 +5407,70 @@
           </p:txBody>
         </p:sp>
       </p:grpSp>
+      <p:sp>
+        <p:nvSpPr>
+          <p:cNvPr id="45" name="TextBox 44">
+            <a:extLst>
+              <a:ext uri="{FF2B5EF4-FFF2-40B4-BE49-F238E27FC236}">
+                <a16:creationId xmlns:a16="http://schemas.microsoft.com/office/drawing/2014/main" id="{7A47607F-6EA7-B33A-001A-AE08491416A6}"/>
+              </a:ext>
+            </a:extLst>
+          </p:cNvPr>
+          <p:cNvSpPr txBox="1"/>
+          <p:nvPr/>
+        </p:nvSpPr>
+        <p:spPr>
+          <a:xfrm flipH="1">
+            <a:off x="18008" y="3963070"/>
+            <a:ext cx="1367381" cy="415498"/>
+          </a:xfrm>
+          <a:prstGeom prst="rect">
+            <a:avLst/>
+          </a:prstGeom>
+          <a:noFill/>
+        </p:spPr>
+        <p:txBody>
+          <a:bodyPr wrap="square" rtlCol="0">
+            <a:spAutoFit/>
+          </a:bodyPr>
+          <a:lstStyle/>
+          <a:p>
+            <a:r>
+              <a:rPr lang="en-US" sz="700" dirty="0"/>
+              <a:t>In this example, 4 names are synonyms in the standardized taxonomy, shown in bold.</a:t>
+            </a:r>
+          </a:p>
+        </p:txBody>
+      </p:sp>
+      <p:pic>
+        <p:nvPicPr>
+          <p:cNvPr id="105" name="Picture 104">
+            <a:extLst>
+              <a:ext uri="{FF2B5EF4-FFF2-40B4-BE49-F238E27FC236}">
+                <a16:creationId xmlns:a16="http://schemas.microsoft.com/office/drawing/2014/main" id="{841F90C7-EE77-B88C-1E33-470A351CF468}"/>
+              </a:ext>
+            </a:extLst>
+          </p:cNvPr>
+          <p:cNvPicPr>
+            <a:picLocks noChangeAspect="1"/>
+          </p:cNvPicPr>
+          <p:nvPr/>
+        </p:nvPicPr>
+        <p:blipFill rotWithShape="1">
+          <a:blip r:embed="rId22"/>
+          <a:srcRect l="14981"/>
+          <a:stretch/>
+        </p:blipFill>
+        <p:spPr>
+          <a:xfrm>
+            <a:off x="5316402" y="1841713"/>
+            <a:ext cx="1853564" cy="580647"/>
+          </a:xfrm>
+          <a:prstGeom prst="rect">
+            <a:avLst/>
+          </a:prstGeom>
+        </p:spPr>
+      </p:pic>
       <p:grpSp>
         <p:nvGrpSpPr>
           <p:cNvPr id="39" name="Group 38">
@@ -5523,7 +5485,7 @@
         </p:nvGrpSpPr>
         <p:grpSpPr>
           <a:xfrm>
-            <a:off x="3735336" y="1155069"/>
+            <a:off x="3621573" y="1234797"/>
             <a:ext cx="674096" cy="369332"/>
             <a:chOff x="3859442" y="1099889"/>
             <a:chExt cx="674096" cy="369332"/>
@@ -5624,6 +5586,42 @@
           </p:txBody>
         </p:sp>
       </p:grpSp>
+      <p:sp>
+        <p:nvSpPr>
+          <p:cNvPr id="57" name="TextBox 56">
+            <a:extLst>
+              <a:ext uri="{FF2B5EF4-FFF2-40B4-BE49-F238E27FC236}">
+                <a16:creationId xmlns:a16="http://schemas.microsoft.com/office/drawing/2014/main" id="{4AE15DB3-A0FF-641D-206B-09AA4C4D3698}"/>
+              </a:ext>
+            </a:extLst>
+          </p:cNvPr>
+          <p:cNvSpPr txBox="1"/>
+          <p:nvPr/>
+        </p:nvSpPr>
+        <p:spPr>
+          <a:xfrm>
+            <a:off x="3446445" y="3564282"/>
+            <a:ext cx="852057" cy="461665"/>
+          </a:xfrm>
+          <a:prstGeom prst="rect">
+            <a:avLst/>
+          </a:prstGeom>
+          <a:noFill/>
+        </p:spPr>
+        <p:txBody>
+          <a:bodyPr wrap="square" rtlCol="0">
+            <a:spAutoFit/>
+          </a:bodyPr>
+          <a:lstStyle/>
+          <a:p>
+            <a:pPr algn="ctr"/>
+            <a:r>
+              <a:rPr lang="en-US" sz="800" b="1" dirty="0"/>
+              <a:t>Median summary chronogram</a:t>
+            </a:r>
+          </a:p>
+        </p:txBody>
+      </p:sp>
       <p:grpSp>
         <p:nvGrpSpPr>
           <p:cNvPr id="47" name="Group 46">
@@ -5638,7 +5636,7 @@
         </p:nvGrpSpPr>
         <p:grpSpPr>
           <a:xfrm>
-            <a:off x="3836095" y="614743"/>
+            <a:off x="3708342" y="614743"/>
             <a:ext cx="518056" cy="292212"/>
             <a:chOff x="5112258" y="655789"/>
             <a:chExt cx="596323" cy="336359"/>
@@ -5711,7 +5709,7 @@
             <p:nvPr/>
           </p:nvPicPr>
           <p:blipFill>
-            <a:blip r:embed="rId21"/>
+            <a:blip r:embed="rId23"/>
             <a:stretch>
               <a:fillRect/>
             </a:stretch>
@@ -5741,8 +5739,8 @@
         </p:nvGrpSpPr>
         <p:grpSpPr>
           <a:xfrm>
-            <a:off x="4173417" y="853750"/>
-            <a:ext cx="511679" cy="338084"/>
+            <a:off x="4058003" y="880799"/>
+            <a:ext cx="540818" cy="357337"/>
             <a:chOff x="4264408" y="1044781"/>
             <a:chExt cx="511679" cy="338084"/>
           </a:xfrm>
@@ -5854,6 +5852,36 @@
           </p:txBody>
         </p:sp>
       </p:grpSp>
+      <p:pic>
+        <p:nvPicPr>
+          <p:cNvPr id="63" name="Picture 62">
+            <a:extLst>
+              <a:ext uri="{FF2B5EF4-FFF2-40B4-BE49-F238E27FC236}">
+                <a16:creationId xmlns:a16="http://schemas.microsoft.com/office/drawing/2014/main" id="{B051DBE3-ACEE-6524-AF7C-59429033EC6D}"/>
+              </a:ext>
+            </a:extLst>
+          </p:cNvPr>
+          <p:cNvPicPr>
+            <a:picLocks noChangeAspect="1"/>
+          </p:cNvPicPr>
+          <p:nvPr/>
+        </p:nvPicPr>
+        <p:blipFill>
+          <a:blip r:embed="rId24"/>
+          <a:stretch>
+            <a:fillRect/>
+          </a:stretch>
+        </p:blipFill>
+        <p:spPr>
+          <a:xfrm flipH="1">
+            <a:off x="2478299" y="2083833"/>
+            <a:ext cx="420342" cy="360293"/>
+          </a:xfrm>
+          <a:prstGeom prst="rect">
+            <a:avLst/>
+          </a:prstGeom>
+        </p:spPr>
+      </p:pic>
       <p:sp>
         <p:nvSpPr>
           <p:cNvPr id="53" name="Right Arrow 52">
@@ -5868,8 +5896,8 @@
         </p:nvSpPr>
         <p:spPr>
           <a:xfrm rot="5400000" flipV="1">
-            <a:off x="3295513" y="1039102"/>
-            <a:ext cx="932848" cy="114599"/>
+            <a:off x="3142375" y="1064490"/>
+            <a:ext cx="974152" cy="105130"/>
           </a:xfrm>
           <a:prstGeom prst="rightArrow">
             <a:avLst/>
@@ -5930,8 +5958,8 @@
         </p:nvSpPr>
         <p:spPr>
           <a:xfrm>
-            <a:off x="5275108" y="1646357"/>
-            <a:ext cx="1612316" cy="200055"/>
+            <a:off x="5087154" y="1653069"/>
+            <a:ext cx="1755185" cy="307777"/>
           </a:xfrm>
           <a:prstGeom prst="rect">
             <a:avLst/>
@@ -5946,143 +5974,37 @@
           <a:p>
             <a:r>
               <a:rPr lang="en-US" sz="700" b="1" dirty="0"/>
-              <a:t>c3) Summarize </a:t>
-            </a:r>
-            <a:r>
-              <a:rPr lang="en-US" sz="700" b="1" dirty="0" err="1"/>
-              <a:t>congruified</a:t>
+              <a:t>c3) </a:t>
+            </a:r>
+            <a:r>
+              <a:rPr lang="en-US" sz="700" dirty="0" err="1"/>
+              <a:t>Congruified</a:t>
             </a:r>
             <a:r>
               <a:rPr lang="en-US" sz="700" b="1" dirty="0"/>
+              <a:t> node ages </a:t>
+            </a:r>
+            <a:r>
+              <a:rPr lang="en-US" sz="700" dirty="0"/>
+              <a:t>are </a:t>
+            </a:r>
+            <a:r>
+              <a:rPr lang="en-US" sz="700" b="1" dirty="0"/>
+              <a:t>summarized</a:t>
+            </a:r>
+            <a:r>
+              <a:rPr lang="en-US" sz="700" dirty="0"/>
               <a:t> </a:t>
             </a:r>
+          </a:p>
+          <a:p>
             <a:r>
               <a:rPr lang="en-US" sz="700" dirty="0"/>
-              <a:t>node ages.</a:t>
-            </a:r>
-          </a:p>
-        </p:txBody>
-      </p:sp>
-      <p:sp>
-        <p:nvSpPr>
-          <p:cNvPr id="57" name="TextBox 56">
-            <a:extLst>
-              <a:ext uri="{FF2B5EF4-FFF2-40B4-BE49-F238E27FC236}">
-                <a16:creationId xmlns:a16="http://schemas.microsoft.com/office/drawing/2014/main" id="{4AE15DB3-A0FF-641D-206B-09AA4C4D3698}"/>
-              </a:ext>
-            </a:extLst>
-          </p:cNvPr>
-          <p:cNvSpPr txBox="1"/>
-          <p:nvPr/>
-        </p:nvSpPr>
-        <p:spPr>
-          <a:xfrm>
-            <a:off x="3582924" y="3435588"/>
-            <a:ext cx="883085" cy="535146"/>
-          </a:xfrm>
-          <a:prstGeom prst="rect">
-            <a:avLst/>
-          </a:prstGeom>
-          <a:noFill/>
-        </p:spPr>
-        <p:txBody>
-          <a:bodyPr wrap="square" rtlCol="0">
-            <a:spAutoFit/>
-          </a:bodyPr>
-          <a:lstStyle/>
-          <a:p>
-            <a:pPr algn="ctr"/>
-            <a:r>
-              <a:rPr lang="en-US" sz="959" b="1" dirty="0"/>
-              <a:t>Median summary chronogram</a:t>
-            </a:r>
-          </a:p>
-        </p:txBody>
-      </p:sp>
-      <p:sp>
-        <p:nvSpPr>
-          <p:cNvPr id="93" name="TextBox 92">
-            <a:extLst>
-              <a:ext uri="{FF2B5EF4-FFF2-40B4-BE49-F238E27FC236}">
-                <a16:creationId xmlns:a16="http://schemas.microsoft.com/office/drawing/2014/main" id="{999A67A6-2919-FFFB-6ED9-FD92B5B0088A}"/>
-              </a:ext>
-            </a:extLst>
-          </p:cNvPr>
-          <p:cNvSpPr txBox="1"/>
-          <p:nvPr/>
-        </p:nvSpPr>
-        <p:spPr>
-          <a:xfrm>
-            <a:off x="4422196" y="3693735"/>
-            <a:ext cx="804637" cy="276999"/>
-          </a:xfrm>
-          <a:prstGeom prst="rect">
-            <a:avLst/>
-          </a:prstGeom>
-          <a:solidFill>
-            <a:schemeClr val="bg1"/>
-          </a:solidFill>
-          <a:ln>
-            <a:noFill/>
-          </a:ln>
-        </p:spPr>
-        <p:txBody>
-          <a:bodyPr wrap="square" rtlCol="0">
-            <a:spAutoFit/>
-          </a:bodyPr>
-          <a:lstStyle/>
-          <a:p>
-            <a:r>
-              <a:rPr lang="en-US" sz="600" b="1" dirty="0">
-                <a:solidFill>
-                  <a:srgbClr val="0000FF"/>
-                </a:solidFill>
-              </a:rPr>
-              <a:t>X   </a:t>
-            </a:r>
-            <a:r>
-              <a:rPr lang="en-US" sz="600" dirty="0"/>
-              <a:t>Median pairwise </a:t>
-            </a:r>
-          </a:p>
-          <a:p>
-            <a:r>
-              <a:rPr lang="en-US" sz="600" dirty="0"/>
-              <a:t>      node ages</a:t>
-            </a:r>
-          </a:p>
-        </p:txBody>
-      </p:sp>
-      <p:pic>
-        <p:nvPicPr>
-          <p:cNvPr id="105" name="Picture 104">
-            <a:extLst>
-              <a:ext uri="{FF2B5EF4-FFF2-40B4-BE49-F238E27FC236}">
-                <a16:creationId xmlns:a16="http://schemas.microsoft.com/office/drawing/2014/main" id="{841F90C7-EE77-B88C-1E33-470A351CF468}"/>
-              </a:ext>
-            </a:extLst>
-          </p:cNvPr>
-          <p:cNvPicPr>
-            <a:picLocks noChangeAspect="1"/>
-          </p:cNvPicPr>
-          <p:nvPr/>
-        </p:nvPicPr>
-        <p:blipFill>
-          <a:blip r:embed="rId22"/>
-          <a:stretch>
-            <a:fillRect/>
-          </a:stretch>
-        </p:blipFill>
-        <p:spPr>
-          <a:xfrm>
-            <a:off x="5049985" y="1767587"/>
-            <a:ext cx="2032263" cy="580647"/>
-          </a:xfrm>
-          <a:prstGeom prst="rect">
-            <a:avLst/>
-          </a:prstGeom>
-        </p:spPr>
-      </p:pic>
+              <a:t>       by node:</a:t>
+            </a:r>
+          </a:p>
+        </p:txBody>
+      </p:sp>
     </p:spTree>
     <p:extLst>
       <p:ext uri="{BB962C8B-B14F-4D97-AF65-F5344CB8AC3E}">

</xml_diff>